<commit_message>
generates pptx by carrer
</commit_message>
<xml_diff>
--- a/generator/INGENIERIA ELECTRICA.pptx
+++ b/generator/INGENIERIA ELECTRICA.pptx
@@ -8,11 +8,9 @@
     <p:sldId id="256" r:id="rId2"/>
     <p:sldId id="257" r:id="rId3"/>
     <p:sldId id="258" r:id="rId4"/>
-    <p:sldId id="259" r:id="rId5"/>
-    <p:sldId id="260" r:id="rId6"/>
   </p:sldIdLst>
   <p:notesMasterIdLst>
-    <p:notesMasterId r:id="rId7"/>
+    <p:notesMasterId r:id="rId5"/>
   </p:notesMasterIdLst>
   <p:sldSz cx="12192000" cy="6858000"/>
   <p:notesSz cx="6858000" cy="12192000"/>
@@ -706,182 +704,6 @@
             <a:fld id="{F7021451-1387-4CA6-816F-3879F97B5CBC}" type="slidenum">
               <a:rPr lang="en-US"/>
               <a:t>3</a:t>
-            </a:fld>
-            <a:endParaRPr lang="en-US"/>
-          </a:p>
-        </p:txBody>
-      </p:sp>
-    </p:spTree>
-    <p:extLst>
-      <p:ext uri="{BB962C8B-B14F-4D97-AF65-F5344CB8AC3E}">
-        <p14:creationId xmlns:p14="http://schemas.microsoft.com/office/powerpoint/2010/main" val="1024086991"/>
-      </p:ext>
-    </p:extLst>
-  </p:cSld>
-  <p:clrMapOvr>
-    <a:masterClrMapping/>
-  </p:clrMapOvr>
-</p:notes>
-</file>
-
-<file path=ppt/notesSlides/notesSlide4.xml><?xml version="1.0" encoding="utf-8"?>
-<p:notes xmlns:a="http://schemas.openxmlformats.org/drawingml/2006/main" xmlns:r="http://schemas.openxmlformats.org/officeDocument/2006/relationships" xmlns:p="http://schemas.openxmlformats.org/presentationml/2006/main">
-  <p:cSld>
-    <p:spTree>
-      <p:nvGrpSpPr>
-        <p:cNvPr id="1" name=""/>
-        <p:cNvGrpSpPr/>
-        <p:nvPr/>
-      </p:nvGrpSpPr>
-      <p:grpSpPr>
-        <a:xfrm>
-          <a:off x="0" y="0"/>
-          <a:ext cx="0" cy="0"/>
-          <a:chOff x="0" y="0"/>
-          <a:chExt cx="0" cy="0"/>
-        </a:xfrm>
-      </p:grpSpPr>
-      <p:sp>
-        <p:nvSpPr>
-          <p:cNvPr id="2" name="Slide Image Placeholder 1"/>
-          <p:cNvSpPr>
-            <a:spLocks noGrp="1" noRot="1" noChangeAspect="1"/>
-          </p:cNvSpPr>
-          <p:nvPr>
-            <p:ph type="sldImg"/>
-          </p:nvPr>
-        </p:nvSpPr>
-        <p:spPr/>
-      </p:sp>
-      <p:sp>
-        <p:nvSpPr>
-          <p:cNvPr id="3" name="Notes Placeholder 2"/>
-          <p:cNvSpPr>
-            <a:spLocks noGrp="1"/>
-          </p:cNvSpPr>
-          <p:nvPr>
-            <p:ph type="body" idx="1"/>
-          </p:nvPr>
-        </p:nvSpPr>
-        <p:spPr/>
-        <p:txBody>
-          <a:bodyPr/>
-          <a:lstStyle/>
-          <a:p>
-            <a:r>
-              <a:rPr lang="en-US" dirty="0"/>
-              <a:t/>
-            </a:r>
-            <a:endParaRPr lang="en-US" dirty="0"/>
-          </a:p>
-        </p:txBody>
-      </p:sp>
-      <p:sp>
-        <p:nvSpPr>
-          <p:cNvPr id="4" name="Slide Number Placeholder 3"/>
-          <p:cNvSpPr>
-            <a:spLocks noGrp="1"/>
-          </p:cNvSpPr>
-          <p:nvPr>
-            <p:ph type="sldNum" sz="quarter" idx="10"/>
-          </p:nvPr>
-        </p:nvSpPr>
-        <p:spPr/>
-        <p:txBody>
-          <a:bodyPr/>
-          <a:lstStyle/>
-          <a:p>
-            <a:fld id="{F7021451-1387-4CA6-816F-3879F97B5CBC}" type="slidenum">
-              <a:rPr lang="en-US"/>
-              <a:t>4</a:t>
-            </a:fld>
-            <a:endParaRPr lang="en-US"/>
-          </a:p>
-        </p:txBody>
-      </p:sp>
-    </p:spTree>
-    <p:extLst>
-      <p:ext uri="{BB962C8B-B14F-4D97-AF65-F5344CB8AC3E}">
-        <p14:creationId xmlns:p14="http://schemas.microsoft.com/office/powerpoint/2010/main" val="1024086991"/>
-      </p:ext>
-    </p:extLst>
-  </p:cSld>
-  <p:clrMapOvr>
-    <a:masterClrMapping/>
-  </p:clrMapOvr>
-</p:notes>
-</file>
-
-<file path=ppt/notesSlides/notesSlide5.xml><?xml version="1.0" encoding="utf-8"?>
-<p:notes xmlns:a="http://schemas.openxmlformats.org/drawingml/2006/main" xmlns:r="http://schemas.openxmlformats.org/officeDocument/2006/relationships" xmlns:p="http://schemas.openxmlformats.org/presentationml/2006/main">
-  <p:cSld>
-    <p:spTree>
-      <p:nvGrpSpPr>
-        <p:cNvPr id="1" name=""/>
-        <p:cNvGrpSpPr/>
-        <p:nvPr/>
-      </p:nvGrpSpPr>
-      <p:grpSpPr>
-        <a:xfrm>
-          <a:off x="0" y="0"/>
-          <a:ext cx="0" cy="0"/>
-          <a:chOff x="0" y="0"/>
-          <a:chExt cx="0" cy="0"/>
-        </a:xfrm>
-      </p:grpSpPr>
-      <p:sp>
-        <p:nvSpPr>
-          <p:cNvPr id="2" name="Slide Image Placeholder 1"/>
-          <p:cNvSpPr>
-            <a:spLocks noGrp="1" noRot="1" noChangeAspect="1"/>
-          </p:cNvSpPr>
-          <p:nvPr>
-            <p:ph type="sldImg"/>
-          </p:nvPr>
-        </p:nvSpPr>
-        <p:spPr/>
-      </p:sp>
-      <p:sp>
-        <p:nvSpPr>
-          <p:cNvPr id="3" name="Notes Placeholder 2"/>
-          <p:cNvSpPr>
-            <a:spLocks noGrp="1"/>
-          </p:cNvSpPr>
-          <p:nvPr>
-            <p:ph type="body" idx="1"/>
-          </p:nvPr>
-        </p:nvSpPr>
-        <p:spPr/>
-        <p:txBody>
-          <a:bodyPr/>
-          <a:lstStyle/>
-          <a:p>
-            <a:r>
-              <a:rPr lang="en-US" dirty="0"/>
-              <a:t/>
-            </a:r>
-            <a:endParaRPr lang="en-US" dirty="0"/>
-          </a:p>
-        </p:txBody>
-      </p:sp>
-      <p:sp>
-        <p:nvSpPr>
-          <p:cNvPr id="4" name="Slide Number Placeholder 3"/>
-          <p:cNvSpPr>
-            <a:spLocks noGrp="1"/>
-          </p:cNvSpPr>
-          <p:nvPr>
-            <p:ph type="sldNum" sz="quarter" idx="10"/>
-          </p:nvPr>
-        </p:nvSpPr>
-        <p:spPr/>
-        <p:txBody>
-          <a:bodyPr/>
-          <a:lstStyle/>
-          <a:p>
-            <a:fld id="{F7021451-1387-4CA6-816F-3879F97B5CBC}" type="slidenum">
-              <a:rPr lang="en-US"/>
-              <a:t>5</a:t>
             </a:fld>
             <a:endParaRPr lang="en-US"/>
           </a:p>
@@ -1821,424 +1643,6 @@
                 </a:solidFill>
               </a:rPr>
               <a:t>LIMON GASTELUM HECTOR GUADALUPE</a:t>
-            </a:r>
-            <a:endParaRPr lang="en-US" sz="2700" dirty="0"/>
-          </a:p>
-        </p:txBody>
-      </p:sp>
-    </p:spTree>
-  </p:cSld>
-  <p:clrMapOvr>
-    <a:masterClrMapping/>
-  </p:clrMapOvr>
-</p:sld>
-</file>
-
-<file path=ppt/slides/slide4.xml><?xml version="1.0" encoding="utf-8"?>
-<p:sld xmlns:a="http://schemas.openxmlformats.org/drawingml/2006/main" xmlns:r="http://schemas.openxmlformats.org/officeDocument/2006/relationships" xmlns:p="http://schemas.openxmlformats.org/presentationml/2006/main">
-  <p:cSld name="Slide 4">
-    <p:spTree>
-      <p:nvGrpSpPr>
-        <p:cNvPr id="1" name=""/>
-        <p:cNvGrpSpPr/>
-        <p:nvPr/>
-      </p:nvGrpSpPr>
-      <p:grpSpPr>
-        <a:xfrm>
-          <a:off x="0" y="0"/>
-          <a:ext cx="0" cy="0"/>
-          <a:chOff x="0" y="0"/>
-          <a:chExt cx="0" cy="0"/>
-        </a:xfrm>
-      </p:grpSpPr>
-      <p:pic>
-        <p:nvPicPr>
-          <p:cNvPr id="2" name="Object 1" descr="../assets/headers/logo.png">    </p:cNvPr>
-          <p:cNvPicPr>
-            <a:picLocks noChangeAspect="1"/>
-          </p:cNvPicPr>
-          <p:nvPr/>
-        </p:nvPicPr>
-        <p:blipFill>
-          <a:blip r:embed="rId1"/>
-          <a:srcRect l="0" r="0" t="-41695" b="-41695"/>
-          <a:stretch/>
-        </p:blipFill>
-        <p:spPr>
-          <a:xfrm>
-            <a:off x="304800" y="0"/>
-            <a:ext cx="6705600" cy="1371600"/>
-          </a:xfrm>
-          <a:prstGeom prst="rect">
-            <a:avLst/>
-          </a:prstGeom>
-        </p:spPr>
-      </p:pic>
-      <p:sp>
-        <p:nvSpPr>
-          <p:cNvPr id="3" name="Object2"/>
-          <p:cNvSpPr/>
-          <p:nvPr/>
-        </p:nvSpPr>
-        <p:spPr>
-          <a:xfrm>
-            <a:off x="0" y="1714500"/>
-            <a:ext cx="7315200" cy="685800"/>
-          </a:xfrm>
-          <a:prstGeom prst="rect">
-            <a:avLst/>
-          </a:prstGeom>
-          <a:noFill/>
-          <a:ln/>
-        </p:spPr>
-        <p:txBody>
-          <a:bodyPr wrap="square" rtlCol="0" anchor="ctr"/>
-          <a:lstStyle/>
-          <a:p>
-            <a:pPr algn="ctr"/>
-            <a:r>
-              <a:rPr lang="en-US" sz="3000" b="1" dirty="0">
-                <a:solidFill>
-                  <a:srgbClr val="1C3467"/>
-                </a:solidFill>
-              </a:rPr>
-              <a:t>Carrera</a:t>
-            </a:r>
-            <a:endParaRPr lang="en-US" sz="3000" dirty="0"/>
-          </a:p>
-        </p:txBody>
-      </p:sp>
-      <p:sp>
-        <p:nvSpPr>
-          <p:cNvPr id="4" name="Object3"/>
-          <p:cNvSpPr/>
-          <p:nvPr/>
-        </p:nvSpPr>
-        <p:spPr>
-          <a:xfrm>
-            <a:off x="0" y="2606040"/>
-            <a:ext cx="7315200" cy="1371600"/>
-          </a:xfrm>
-          <a:prstGeom prst="rect">
-            <a:avLst/>
-          </a:prstGeom>
-          <a:noFill/>
-          <a:ln/>
-        </p:spPr>
-        <p:txBody>
-          <a:bodyPr wrap="square" rtlCol="0" anchor="ctr"/>
-          <a:lstStyle/>
-          <a:p>
-            <a:pPr algn="ctr"/>
-            <a:r>
-              <a:rPr lang="en-US" sz="2500" dirty="0">
-                <a:solidFill>
-                  <a:srgbClr val="1C3467"/>
-                </a:solidFill>
-              </a:rPr>
-              <a:t>INGENIERIA MECATRONICA</a:t>
-            </a:r>
-            <a:endParaRPr lang="en-US" sz="2500" dirty="0"/>
-          </a:p>
-        </p:txBody>
-      </p:sp>
-      <p:sp>
-        <p:nvSpPr>
-          <p:cNvPr id="5" name="Object4"/>
-          <p:cNvSpPr/>
-          <p:nvPr/>
-        </p:nvSpPr>
-        <p:spPr>
-          <a:xfrm>
-            <a:off x="0" y="4114800"/>
-            <a:ext cx="7315200" cy="685800"/>
-          </a:xfrm>
-          <a:prstGeom prst="rect">
-            <a:avLst/>
-          </a:prstGeom>
-          <a:noFill/>
-          <a:ln/>
-        </p:spPr>
-        <p:txBody>
-          <a:bodyPr wrap="square" rtlCol="0" anchor="ctr"/>
-          <a:lstStyle/>
-          <a:p>
-            <a:pPr algn="ctr"/>
-            <a:r>
-              <a:rPr lang="en-US" sz="3000" b="1" dirty="0">
-                <a:solidFill>
-                  <a:srgbClr val="1C3467"/>
-                </a:solidFill>
-              </a:rPr>
-              <a:t>Generación 2015-2019</a:t>
-            </a:r>
-            <a:endParaRPr lang="en-US" sz="3000" dirty="0"/>
-          </a:p>
-        </p:txBody>
-      </p:sp>
-      <p:pic>
-        <p:nvPicPr>
-          <p:cNvPr id="6" name="Object 5" descr="../assets/img/INGENIERIA MECATRONICA/13170088.jpeg">    </p:cNvPr>
-          <p:cNvPicPr>
-            <a:picLocks noChangeAspect="1"/>
-          </p:cNvPicPr>
-          <p:nvPr/>
-        </p:nvPicPr>
-        <p:blipFill>
-          <a:blip r:embed="rId2"/>
-          <a:srcRect l="0" r="0" t="0" b="0"/>
-          <a:stretch/>
-        </p:blipFill>
-        <p:spPr>
-          <a:xfrm>
-            <a:off x="7315200" y="0"/>
-            <a:ext cx="4876800" cy="6172200"/>
-          </a:xfrm>
-          <a:prstGeom prst="rect">
-            <a:avLst/>
-          </a:prstGeom>
-        </p:spPr>
-      </p:pic>
-      <p:sp>
-        <p:nvSpPr>
-          <p:cNvPr id="7" name="Object6"/>
-          <p:cNvSpPr/>
-          <p:nvPr/>
-        </p:nvSpPr>
-        <p:spPr>
-          <a:xfrm>
-            <a:off x="0" y="6172200"/>
-            <a:ext cx="12192000" cy="685800"/>
-          </a:xfrm>
-          <a:prstGeom prst="rect">
-            <a:avLst/>
-          </a:prstGeom>
-          <a:solidFill>
-            <a:srgbClr val="1C3467"/>
-          </a:solidFill>
-          <a:ln/>
-        </p:spPr>
-        <p:txBody>
-          <a:bodyPr wrap="square" rtlCol="0" anchor="ctr"/>
-          <a:lstStyle/>
-          <a:p>
-            <a:pPr algn="ctr"/>
-            <a:r>
-              <a:rPr lang="en-US" sz="2700" b="1" dirty="0">
-                <a:solidFill>
-                  <a:srgbClr val="FFFFFF"/>
-                </a:solidFill>
-              </a:rPr>
-              <a:t>MONTOYA GERARDO EMMANUEL</a:t>
-            </a:r>
-            <a:endParaRPr lang="en-US" sz="2700" dirty="0"/>
-          </a:p>
-        </p:txBody>
-      </p:sp>
-    </p:spTree>
-  </p:cSld>
-  <p:clrMapOvr>
-    <a:masterClrMapping/>
-  </p:clrMapOvr>
-</p:sld>
-</file>
-
-<file path=ppt/slides/slide5.xml><?xml version="1.0" encoding="utf-8"?>
-<p:sld xmlns:a="http://schemas.openxmlformats.org/drawingml/2006/main" xmlns:r="http://schemas.openxmlformats.org/officeDocument/2006/relationships" xmlns:p="http://schemas.openxmlformats.org/presentationml/2006/main">
-  <p:cSld name="Slide 5">
-    <p:spTree>
-      <p:nvGrpSpPr>
-        <p:cNvPr id="1" name=""/>
-        <p:cNvGrpSpPr/>
-        <p:nvPr/>
-      </p:nvGrpSpPr>
-      <p:grpSpPr>
-        <a:xfrm>
-          <a:off x="0" y="0"/>
-          <a:ext cx="0" cy="0"/>
-          <a:chOff x="0" y="0"/>
-          <a:chExt cx="0" cy="0"/>
-        </a:xfrm>
-      </p:grpSpPr>
-      <p:pic>
-        <p:nvPicPr>
-          <p:cNvPr id="2" name="Object 1" descr="../assets/headers/logo.png">    </p:cNvPr>
-          <p:cNvPicPr>
-            <a:picLocks noChangeAspect="1"/>
-          </p:cNvPicPr>
-          <p:nvPr/>
-        </p:nvPicPr>
-        <p:blipFill>
-          <a:blip r:embed="rId1"/>
-          <a:srcRect l="0" r="0" t="-41695" b="-41695"/>
-          <a:stretch/>
-        </p:blipFill>
-        <p:spPr>
-          <a:xfrm>
-            <a:off x="304800" y="0"/>
-            <a:ext cx="6705600" cy="1371600"/>
-          </a:xfrm>
-          <a:prstGeom prst="rect">
-            <a:avLst/>
-          </a:prstGeom>
-        </p:spPr>
-      </p:pic>
-      <p:sp>
-        <p:nvSpPr>
-          <p:cNvPr id="3" name="Object2"/>
-          <p:cNvSpPr/>
-          <p:nvPr/>
-        </p:nvSpPr>
-        <p:spPr>
-          <a:xfrm>
-            <a:off x="0" y="1714500"/>
-            <a:ext cx="7315200" cy="685800"/>
-          </a:xfrm>
-          <a:prstGeom prst="rect">
-            <a:avLst/>
-          </a:prstGeom>
-          <a:noFill/>
-          <a:ln/>
-        </p:spPr>
-        <p:txBody>
-          <a:bodyPr wrap="square" rtlCol="0" anchor="ctr"/>
-          <a:lstStyle/>
-          <a:p>
-            <a:pPr algn="ctr"/>
-            <a:r>
-              <a:rPr lang="en-US" sz="3000" b="1" dirty="0">
-                <a:solidFill>
-                  <a:srgbClr val="1C3467"/>
-                </a:solidFill>
-              </a:rPr>
-              <a:t>Carrera</a:t>
-            </a:r>
-            <a:endParaRPr lang="en-US" sz="3000" dirty="0"/>
-          </a:p>
-        </p:txBody>
-      </p:sp>
-      <p:sp>
-        <p:nvSpPr>
-          <p:cNvPr id="4" name="Object3"/>
-          <p:cNvSpPr/>
-          <p:nvPr/>
-        </p:nvSpPr>
-        <p:spPr>
-          <a:xfrm>
-            <a:off x="0" y="2606040"/>
-            <a:ext cx="7315200" cy="1371600"/>
-          </a:xfrm>
-          <a:prstGeom prst="rect">
-            <a:avLst/>
-          </a:prstGeom>
-          <a:noFill/>
-          <a:ln/>
-        </p:spPr>
-        <p:txBody>
-          <a:bodyPr wrap="square" rtlCol="0" anchor="ctr"/>
-          <a:lstStyle/>
-          <a:p>
-            <a:pPr algn="ctr"/>
-            <a:r>
-              <a:rPr lang="en-US" sz="2500" dirty="0">
-                <a:solidFill>
-                  <a:srgbClr val="1C3467"/>
-                </a:solidFill>
-              </a:rPr>
-              <a:t>INGENIERIA EN SISTEMAS COMPUTACIONALES</a:t>
-            </a:r>
-            <a:endParaRPr lang="en-US" sz="2500" dirty="0"/>
-          </a:p>
-        </p:txBody>
-      </p:sp>
-      <p:sp>
-        <p:nvSpPr>
-          <p:cNvPr id="5" name="Object4"/>
-          <p:cNvSpPr/>
-          <p:nvPr/>
-        </p:nvSpPr>
-        <p:spPr>
-          <a:xfrm>
-            <a:off x="0" y="4114800"/>
-            <a:ext cx="7315200" cy="685800"/>
-          </a:xfrm>
-          <a:prstGeom prst="rect">
-            <a:avLst/>
-          </a:prstGeom>
-          <a:noFill/>
-          <a:ln/>
-        </p:spPr>
-        <p:txBody>
-          <a:bodyPr wrap="square" rtlCol="0" anchor="ctr"/>
-          <a:lstStyle/>
-          <a:p>
-            <a:pPr algn="ctr"/>
-            <a:r>
-              <a:rPr lang="en-US" sz="3000" b="1" dirty="0">
-                <a:solidFill>
-                  <a:srgbClr val="1C3467"/>
-                </a:solidFill>
-              </a:rPr>
-              <a:t>Generación 2015-2019</a:t>
-            </a:r>
-            <a:endParaRPr lang="en-US" sz="3000" dirty="0"/>
-          </a:p>
-        </p:txBody>
-      </p:sp>
-      <p:pic>
-        <p:nvPicPr>
-          <p:cNvPr id="6" name="Object 5" descr="../assets/img/INGENIERIA EN SISTEMAS COMPUTACIONALES/13170115.jpeg">    </p:cNvPr>
-          <p:cNvPicPr>
-            <a:picLocks noChangeAspect="1"/>
-          </p:cNvPicPr>
-          <p:nvPr/>
-        </p:nvPicPr>
-        <p:blipFill>
-          <a:blip r:embed="rId2"/>
-          <a:srcRect l="0" r="0" t="0" b="0"/>
-          <a:stretch/>
-        </p:blipFill>
-        <p:spPr>
-          <a:xfrm>
-            <a:off x="7315200" y="0"/>
-            <a:ext cx="4876800" cy="6172200"/>
-          </a:xfrm>
-          <a:prstGeom prst="rect">
-            <a:avLst/>
-          </a:prstGeom>
-        </p:spPr>
-      </p:pic>
-      <p:sp>
-        <p:nvSpPr>
-          <p:cNvPr id="7" name="Object6"/>
-          <p:cNvSpPr/>
-          <p:nvPr/>
-        </p:nvSpPr>
-        <p:spPr>
-          <a:xfrm>
-            <a:off x="0" y="6172200"/>
-            <a:ext cx="12192000" cy="685800"/>
-          </a:xfrm>
-          <a:prstGeom prst="rect">
-            <a:avLst/>
-          </a:prstGeom>
-          <a:solidFill>
-            <a:srgbClr val="1C3467"/>
-          </a:solidFill>
-          <a:ln/>
-        </p:spPr>
-        <p:txBody>
-          <a:bodyPr wrap="square" rtlCol="0" anchor="ctr"/>
-          <a:lstStyle/>
-          <a:p>
-            <a:pPr algn="ctr"/>
-            <a:r>
-              <a:rPr lang="en-US" sz="2700" b="1" dirty="0">
-                <a:solidFill>
-                  <a:srgbClr val="FFFFFF"/>
-                </a:solidFill>
-              </a:rPr>
-              <a:t>TORRES AGUIRRE JAVIER GILBERTO</a:t>
             </a:r>
             <a:endParaRPr lang="en-US" sz="2700" dirty="0"/>
           </a:p>

</xml_diff>